<commit_message>
change last script a bit
</commit_message>
<xml_diff>
--- a/BAN1/B_Mar22/B_EDA_Practice.pptx
+++ b/BAN1/B_Mar22/B_EDA_Practice.pptx
@@ -209,7 +209,7 @@
           <a:p>
             <a:fld id="{C333ABA6-B72D-4ED4-A6E7-13A0DAE65F1A}" type="datetimeFigureOut">
               <a:rPr lang="en-US" smtClean="0"/>
-              <a:t>2/16/23</a:t>
+              <a:t>3/22/23</a:t>
             </a:fld>
             <a:endParaRPr lang="en-US"/>
           </a:p>
@@ -692,7 +692,7 @@
           <a:p>
             <a:fld id="{5738B90E-0779-4C36-915C-6F05FCD89456}" type="datetime1">
               <a:rPr lang="en-US" smtClean="0"/>
-              <a:t>2/16/23</a:t>
+              <a:t>3/22/23</a:t>
             </a:fld>
             <a:endParaRPr lang="en-US"/>
           </a:p>
@@ -869,7 +869,7 @@
           <a:p>
             <a:fld id="{7B9EA29D-D431-42FE-B7B6-AAE4454C77D3}" type="datetime1">
               <a:rPr lang="en-US" smtClean="0"/>
-              <a:t>2/16/23</a:t>
+              <a:t>3/22/23</a:t>
             </a:fld>
             <a:endParaRPr lang="en-US"/>
           </a:p>
@@ -1088,7 +1088,7 @@
           <a:p>
             <a:fld id="{690D8A1E-EA8F-46C1-B891-AE0C00D9C314}" type="datetime1">
               <a:rPr lang="en-US" smtClean="0"/>
-              <a:t>2/16/23</a:t>
+              <a:t>3/22/23</a:t>
             </a:fld>
             <a:endParaRPr lang="en-US"/>
           </a:p>
@@ -1341,7 +1341,7 @@
           <a:p>
             <a:fld id="{D753EFC8-4232-4598-94F6-94C0EBAFC469}" type="datetime1">
               <a:rPr lang="en-US" smtClean="0"/>
-              <a:t>2/16/23</a:t>
+              <a:t>3/22/23</a:t>
             </a:fld>
             <a:endParaRPr lang="en-US"/>
           </a:p>
@@ -1615,7 +1615,7 @@
           <a:p>
             <a:fld id="{F3161074-1C18-4AE7-957D-F18524378C85}" type="datetime1">
               <a:rPr lang="en-US" smtClean="0"/>
-              <a:t>2/16/23</a:t>
+              <a:t>3/22/23</a:t>
             </a:fld>
             <a:endParaRPr lang="en-US"/>
           </a:p>
@@ -1848,7 +1848,7 @@
           <a:p>
             <a:fld id="{69BE256C-8D9A-4404-B47D-41A1AE514425}" type="datetime1">
               <a:rPr lang="en-US" smtClean="0"/>
-              <a:t>2/16/23</a:t>
+              <a:t>3/22/23</a:t>
             </a:fld>
             <a:endParaRPr lang="en-US"/>
           </a:p>
@@ -2241,7 +2241,7 @@
           <a:p>
             <a:fld id="{66CB2154-9035-4012-8189-BAAB61C5A5EE}" type="datetime1">
               <a:rPr lang="en-US" smtClean="0"/>
-              <a:t>2/16/23</a:t>
+              <a:t>3/22/23</a:t>
             </a:fld>
             <a:endParaRPr lang="en-US"/>
           </a:p>
@@ -2374,7 +2374,7 @@
           <a:p>
             <a:fld id="{6700A58B-DD98-43D0-B791-721480A02982}" type="datetime1">
               <a:rPr lang="en-US" smtClean="0"/>
-              <a:t>2/16/23</a:t>
+              <a:t>3/22/23</a:t>
             </a:fld>
             <a:endParaRPr lang="en-US"/>
           </a:p>
@@ -2525,7 +2525,7 @@
           <a:p>
             <a:fld id="{7DB6E382-4F61-4E24-BE1A-377EC83D0E3A}" type="datetime1">
               <a:rPr lang="en-US" smtClean="0"/>
-              <a:t>2/16/23</a:t>
+              <a:t>3/22/23</a:t>
             </a:fld>
             <a:endParaRPr lang="en-US"/>
           </a:p>
@@ -2795,7 +2795,7 @@
           <a:p>
             <a:fld id="{4142EED6-FC16-45B9-B8C4-2BC5DBA88325}" type="datetime1">
               <a:rPr lang="en-US" smtClean="0"/>
-              <a:t>2/16/23</a:t>
+              <a:t>3/22/23</a:t>
             </a:fld>
             <a:endParaRPr lang="en-US"/>
           </a:p>
@@ -3072,7 +3072,7 @@
           <a:p>
             <a:fld id="{DF59512B-4F1D-43D7-8819-2F53FEF69650}" type="datetime1">
               <a:rPr lang="en-US" smtClean="0"/>
-              <a:t>2/16/23</a:t>
+              <a:t>3/22/23</a:t>
             </a:fld>
             <a:endParaRPr lang="en-US"/>
           </a:p>
@@ -3307,7 +3307,7 @@
           <a:p>
             <a:fld id="{08437B94-E2BF-44DC-ADC5-B05FC9934E9D}" type="datetime1">
               <a:rPr lang="en-US" smtClean="0"/>
-              <a:t>2/16/23</a:t>
+              <a:t>3/22/23</a:t>
             </a:fld>
             <a:endParaRPr lang="en-US"/>
           </a:p>
@@ -4233,7 +4233,7 @@
           <a:p>
             <a:fld id="{9B19E99B-5349-415A-8E56-8E989211A366}" type="datetime1">
               <a:rPr lang="en-US" smtClean="0"/>
-              <a:t>2/16/23</a:t>
+              <a:t>3/22/23</a:t>
             </a:fld>
             <a:endParaRPr lang="en-US"/>
           </a:p>
@@ -4372,7 +4372,7 @@
           <a:p>
             <a:fld id="{6700A58B-DD98-43D0-B791-721480A02982}" type="datetime1">
               <a:rPr lang="en-US" smtClean="0"/>
-              <a:t>2/16/23</a:t>
+              <a:t>3/22/23</a:t>
             </a:fld>
             <a:endParaRPr lang="en-US"/>
           </a:p>
@@ -4635,7 +4635,7 @@
           <a:p>
             <a:fld id="{6700A58B-DD98-43D0-B791-721480A02982}" type="datetime1">
               <a:rPr lang="en-US" smtClean="0"/>
-              <a:t>2/16/23</a:t>
+              <a:t>3/22/23</a:t>
             </a:fld>
             <a:endParaRPr lang="en-US"/>
           </a:p>
@@ -5064,7 +5064,7 @@
           <a:p>
             <a:fld id="{D753EFC8-4232-4598-94F6-94C0EBAFC469}" type="datetime1">
               <a:rPr lang="en-US" smtClean="0"/>
-              <a:t>2/16/23</a:t>
+              <a:t>3/22/23</a:t>
             </a:fld>
             <a:endParaRPr lang="en-US"/>
           </a:p>
@@ -5584,7 +5584,7 @@
           <a:p>
             <a:fld id="{6700A58B-DD98-43D0-B791-721480A02982}" type="datetime1">
               <a:rPr lang="en-US" smtClean="0"/>
-              <a:t>2/16/23</a:t>
+              <a:t>3/22/23</a:t>
             </a:fld>
             <a:endParaRPr lang="en-US"/>
           </a:p>
@@ -5666,15 +5666,7 @@
             </a:pPr>
             <a:r>
               <a:rPr lang="en-US" sz="2400" dirty="0"/>
-              <a:t>Start </a:t>
-            </a:r>
-            <a:r>
-              <a:rPr lang="en-US" sz="2400" dirty="0" err="1"/>
-              <a:t>okCupid</a:t>
-            </a:r>
-            <a:r>
-              <a:rPr lang="en-US" sz="2400" dirty="0"/>
-              <a:t> Case in code or with </a:t>
+              <a:t>Start Case 1 in code or with </a:t>
             </a:r>
             <a:r>
               <a:rPr lang="en-US" sz="2400" dirty="0" err="1"/>
@@ -5773,7 +5765,7 @@
           <a:p>
             <a:fld id="{6700A58B-DD98-43D0-B791-721480A02982}" type="datetime1">
               <a:rPr lang="en-US" smtClean="0"/>
-              <a:t>2/16/23</a:t>
+              <a:t>3/22/23</a:t>
             </a:fld>
             <a:endParaRPr lang="en-US"/>
           </a:p>
@@ -6036,7 +6028,7 @@
           <a:p>
             <a:fld id="{6700A58B-DD98-43D0-B791-721480A02982}" type="datetime1">
               <a:rPr lang="en-US" smtClean="0"/>
-              <a:t>2/16/23</a:t>
+              <a:t>3/22/23</a:t>
             </a:fld>
             <a:endParaRPr lang="en-US"/>
           </a:p>
@@ -6498,7 +6490,7 @@
           <a:p>
             <a:fld id="{6700A58B-DD98-43D0-B791-721480A02982}" type="datetime1">
               <a:rPr lang="en-US" smtClean="0"/>
-              <a:t>2/16/23</a:t>
+              <a:t>3/22/23</a:t>
             </a:fld>
             <a:endParaRPr lang="en-US"/>
           </a:p>
@@ -6978,7 +6970,7 @@
           <a:p>
             <a:fld id="{6700A58B-DD98-43D0-B791-721480A02982}" type="datetime1">
               <a:rPr lang="en-US" smtClean="0"/>
-              <a:t>2/16/23</a:t>
+              <a:t>3/22/23</a:t>
             </a:fld>
             <a:endParaRPr lang="en-US"/>
           </a:p>
@@ -7449,7 +7441,7 @@
           <a:p>
             <a:fld id="{6700A58B-DD98-43D0-B791-721480A02982}" type="datetime1">
               <a:rPr lang="en-US" smtClean="0"/>
-              <a:t>2/16/23</a:t>
+              <a:t>3/22/23</a:t>
             </a:fld>
             <a:endParaRPr lang="en-US"/>
           </a:p>
@@ -7670,7 +7662,7 @@
           <a:p>
             <a:fld id="{6700A58B-DD98-43D0-B791-721480A02982}" type="datetime1">
               <a:rPr lang="en-US" smtClean="0"/>
-              <a:t>2/16/23</a:t>
+              <a:t>3/22/23</a:t>
             </a:fld>
             <a:endParaRPr lang="en-US"/>
           </a:p>
@@ -7909,7 +7901,7 @@
           <a:p>
             <a:fld id="{6700A58B-DD98-43D0-B791-721480A02982}" type="datetime1">
               <a:rPr lang="en-US" smtClean="0"/>
-              <a:t>2/16/23</a:t>
+              <a:t>3/22/23</a:t>
             </a:fld>
             <a:endParaRPr lang="en-US"/>
           </a:p>
@@ -8249,7 +8241,7 @@
           <a:p>
             <a:fld id="{6700A58B-DD98-43D0-B791-721480A02982}" type="datetime1">
               <a:rPr lang="en-US" smtClean="0"/>
-              <a:t>2/16/23</a:t>
+              <a:t>3/22/23</a:t>
             </a:fld>
             <a:endParaRPr lang="en-US"/>
           </a:p>
@@ -8536,15 +8528,6 @@
                 <a:latin typeface="Franklin Gothic Book" pitchFamily="34" charset="0"/>
               </a:rPr>
               <a:t>Credit Card Transactions (99+% no fraud) vs (&lt;1% fraud)</a:t>
-            </a:r>
-          </a:p>
-          <a:p>
-            <a:pPr lvl="1"/>
-            <a:r>
-              <a:rPr lang="en-US" altLang="en-US" dirty="0">
-                <a:latin typeface="Franklin Gothic Book" pitchFamily="34" charset="0"/>
-              </a:rPr>
-              <a:t>If your modeling is unbalanced, the book has an example of oversampling</a:t>
             </a:r>
           </a:p>
         </p:txBody>

</xml_diff>